<commit_message>
Change some contents in file Abstract Factory.pptx
Change some contents in slide 6 of file Abstract Factory.pptx
</commit_message>
<xml_diff>
--- a/Slide/Abstract Factory.pptx
+++ b/Slide/Abstract Factory.pptx
@@ -287,7 +287,7 @@
       </p15:notesGuideLst>
     </p:ext>
     <p:ext uri="http://customooxmlschemas.google.com/">
-      <go:slidesCustomData xmlns="" xmlns:mc="http://schemas.openxmlformats.org/markup-compatibility/2006" xmlns:mv="urn:schemas-microsoft-com:mac:vml" xmlns:c="http://schemas.openxmlformats.org/drawingml/2006/chart" xmlns:dgm="http://schemas.openxmlformats.org/drawingml/2006/diagram" xmlns:o="urn:schemas-microsoft-com:office:office" xmlns:v="urn:schemas-microsoft-com:vml" xmlns:pvml="urn:schemas-microsoft-com:office:powerpoint" xmlns:com="http://schemas.openxmlformats.org/drawingml/2006/compatibility" xmlns:p14="http://schemas.microsoft.com/office/powerpoint/2010/main" xmlns:p15="http://schemas.microsoft.com/office/powerpoint/2012/main" xmlns:ahyp="http://schemas.microsoft.com/office/drawing/2018/hyperlinkcolor" xmlns:go="http://customooxmlschemas.google.com/" r:id="rId27" roundtripDataSignature="AMtx7mhbmycMKqNOrrOODYA7hCOjlhMVog=="/>
+      <go:slidesCustomData xmlns:go="http://customooxmlschemas.google.com/" xmlns:ahyp="http://schemas.microsoft.com/office/drawing/2018/hyperlinkcolor" xmlns:p15="http://schemas.microsoft.com/office/powerpoint/2012/main" xmlns:p14="http://schemas.microsoft.com/office/powerpoint/2010/main" xmlns:com="http://schemas.openxmlformats.org/drawingml/2006/compatibility" xmlns:pvml="urn:schemas-microsoft-com:office:powerpoint" xmlns:v="urn:schemas-microsoft-com:vml" xmlns:o="urn:schemas-microsoft-com:office:office" xmlns:dgm="http://schemas.openxmlformats.org/drawingml/2006/diagram" xmlns:c="http://schemas.openxmlformats.org/drawingml/2006/chart" xmlns:mv="urn:schemas-microsoft-com:mac:vml" xmlns:mc="http://schemas.openxmlformats.org/markup-compatibility/2006" xmlns="" r:id="rId27" roundtripDataSignature="AMtx7mhbmycMKqNOrrOODYA7hCOjlhMVog=="/>
     </p:ext>
   </p:extLst>
 </p:presentation>
@@ -2326,7 +2326,7 @@
         <p:spPr>
           <a:xfrm>
             <a:off x="3236913" y="509588"/>
-            <a:ext cx="3398700" cy="2549400"/>
+            <a:ext cx="3398837" cy="2549525"/>
           </a:xfrm>
           <a:custGeom>
             <a:avLst/>
@@ -12179,8 +12179,8 @@
         </p:nvSpPr>
         <p:spPr>
           <a:xfrm>
-            <a:off x="457200" y="152400"/>
-            <a:ext cx="8686800" cy="685800"/>
+            <a:off x="390525" y="152400"/>
+            <a:ext cx="8753475" cy="685800"/>
           </a:xfrm>
           <a:prstGeom prst="rect">
             <a:avLst/>
@@ -12233,8 +12233,8 @@
         </p:nvSpPr>
         <p:spPr>
           <a:xfrm>
-            <a:off x="533400" y="1066800"/>
-            <a:ext cx="8458200" cy="5638800"/>
+            <a:off x="219075" y="1066800"/>
+            <a:ext cx="8753475" cy="5638800"/>
           </a:xfrm>
           <a:prstGeom prst="rect">
             <a:avLst/>
@@ -12270,16 +12270,13 @@
             <a:endParaRPr sz="2400"/>
           </a:p>
           <a:p>
-            <a:pPr marL="457200" lvl="0" indent="-381000" algn="just" rtl="0">
+            <a:pPr lvl="0" indent="-381000">
               <a:lnSpc>
                 <a:spcPct val="120000"/>
               </a:lnSpc>
               <a:spcBef>
                 <a:spcPts val="0"/>
               </a:spcBef>
-              <a:spcAft>
-                <a:spcPts val="0"/>
-              </a:spcAft>
               <a:buClr>
                 <a:srgbClr val="1B1B1B"/>
               </a:buClr>
@@ -12287,7 +12284,7 @@
               <a:buChar char="-"/>
             </a:pPr>
             <a:r>
-              <a:rPr lang="en-US" sz="2400">
+              <a:rPr lang="en-US" sz="2400" b="1">
                 <a:solidFill>
                   <a:srgbClr val="1B1B1B"/>
                 </a:solidFill>
@@ -12295,7 +12292,85 @@
                   <a:schemeClr val="lt1"/>
                 </a:highlight>
               </a:rPr>
-              <a:t>AbstractFactory: Khai báo dạng interface hoặc abstract class chứa các phương thức để tạo ra các đối tượng abstract.</a:t>
+              <a:t>AbstractFactory:</a:t>
+            </a:r>
+            <a:r>
+              <a:rPr lang="en-US" sz="2400">
+                <a:solidFill>
+                  <a:srgbClr val="1B1B1B"/>
+                </a:solidFill>
+                <a:highlight>
+                  <a:schemeClr val="lt1"/>
+                </a:highlight>
+              </a:rPr>
+              <a:t> </a:t>
+            </a:r>
+            <a:r>
+              <a:rPr lang="vi-VN" sz="2400">
+                <a:solidFill>
+                  <a:srgbClr val="1B1B1B"/>
+                </a:solidFill>
+              </a:rPr>
+              <a:t>Khai báo một </a:t>
+            </a:r>
+            <a:r>
+              <a:rPr lang="en-US" sz="2400">
+                <a:solidFill>
+                  <a:srgbClr val="1B1B1B"/>
+                </a:solidFill>
+              </a:rPr>
+              <a:t>interface </a:t>
+            </a:r>
+            <a:r>
+              <a:rPr lang="vi-VN" sz="2400">
+                <a:solidFill>
+                  <a:srgbClr val="1B1B1B"/>
+                </a:solidFill>
+              </a:rPr>
+              <a:t>ch</a:t>
+            </a:r>
+            <a:r>
+              <a:rPr lang="en-US" sz="2400">
+                <a:solidFill>
+                  <a:srgbClr val="1B1B1B"/>
+                </a:solidFill>
+              </a:rPr>
+              <a:t>ứa</a:t>
+            </a:r>
+            <a:r>
+              <a:rPr lang="vi-VN" sz="2400">
+                <a:solidFill>
+                  <a:srgbClr val="1B1B1B"/>
+                </a:solidFill>
+              </a:rPr>
+              <a:t> các </a:t>
+            </a:r>
+            <a:r>
+              <a:rPr lang="en-US" sz="2400">
+                <a:solidFill>
+                  <a:srgbClr val="1B1B1B"/>
+                </a:solidFill>
+              </a:rPr>
+              <a:t>phương thức dùng để </a:t>
+            </a:r>
+            <a:r>
+              <a:rPr lang="vi-VN" sz="2400">
+                <a:solidFill>
+                  <a:srgbClr val="1B1B1B"/>
+                </a:solidFill>
+              </a:rPr>
+              <a:t>tạo ra các đối tượng</a:t>
+            </a:r>
+            <a:r>
+              <a:rPr lang="en-US" sz="2400">
+                <a:solidFill>
+                  <a:srgbClr val="1B1B1B"/>
+                </a:solidFill>
+                <a:highlight>
+                  <a:schemeClr val="lt1"/>
+                </a:highlight>
+              </a:rPr>
+              <a:t> AbstractProduct</a:t>
             </a:r>
             <a:endParaRPr sz="2400">
               <a:solidFill>
@@ -12307,16 +12382,13 @@
             </a:endParaRPr>
           </a:p>
           <a:p>
-            <a:pPr marL="457200" lvl="0" indent="-381000" algn="l" rtl="0">
+            <a:pPr lvl="0" indent="-381000">
               <a:lnSpc>
                 <a:spcPct val="115000"/>
               </a:lnSpc>
               <a:spcBef>
                 <a:spcPts val="0"/>
               </a:spcBef>
-              <a:spcAft>
-                <a:spcPts val="0"/>
-              </a:spcAft>
               <a:buClr>
                 <a:srgbClr val="1B1B1B"/>
               </a:buClr>
@@ -12324,7 +12396,7 @@
               <a:buChar char="-"/>
             </a:pPr>
             <a:r>
-              <a:rPr lang="en-US" sz="2400">
+              <a:rPr lang="en-US" sz="2400" b="1">
                 <a:solidFill>
                   <a:srgbClr val="1B1B1B"/>
                 </a:solidFill>
@@ -12332,7 +12404,135 @@
                   <a:schemeClr val="lt1"/>
                 </a:highlight>
               </a:rPr>
-              <a:t>ConcreteFactory: Xây dựng, cài đặt các phương thức tạo các đối tượng cụ thể.</a:t>
+              <a:t>ConcreteFactory:</a:t>
+            </a:r>
+            <a:r>
+              <a:rPr lang="en-US" sz="2400">
+                <a:solidFill>
+                  <a:srgbClr val="1B1B1B"/>
+                </a:solidFill>
+                <a:highlight>
+                  <a:schemeClr val="lt1"/>
+                </a:highlight>
+              </a:rPr>
+              <a:t> </a:t>
+            </a:r>
+            <a:r>
+              <a:rPr lang="en-US" sz="2400">
+                <a:solidFill>
+                  <a:srgbClr val="1B1B1B"/>
+                </a:solidFill>
+              </a:rPr>
+              <a:t>Cài đặt </a:t>
+            </a:r>
+            <a:r>
+              <a:rPr lang="vi-VN" sz="2400">
+                <a:solidFill>
+                  <a:srgbClr val="1B1B1B"/>
+                </a:solidFill>
+              </a:rPr>
+              <a:t>các </a:t>
+            </a:r>
+            <a:r>
+              <a:rPr lang="en-US" sz="2400">
+                <a:solidFill>
+                  <a:srgbClr val="1B1B1B"/>
+                </a:solidFill>
+              </a:rPr>
+              <a:t>phương thức </a:t>
+            </a:r>
+            <a:r>
+              <a:rPr lang="vi-VN" sz="2400">
+                <a:solidFill>
+                  <a:srgbClr val="1B1B1B"/>
+                </a:solidFill>
+              </a:rPr>
+              <a:t>trong</a:t>
+            </a:r>
+            <a:r>
+              <a:rPr lang="en-US" sz="2400">
+                <a:solidFill>
+                  <a:srgbClr val="1B1B1B"/>
+                </a:solidFill>
+              </a:rPr>
+              <a:t> </a:t>
+            </a:r>
+            <a:r>
+              <a:rPr lang="en-US" sz="2400">
+                <a:solidFill>
+                  <a:srgbClr val="1B1B1B"/>
+                </a:solidFill>
+                <a:highlight>
+                  <a:schemeClr val="lt1"/>
+                </a:highlight>
+              </a:rPr>
+              <a:t>AbstractFactory </a:t>
+            </a:r>
+            <a:r>
+              <a:rPr lang="vi-VN" sz="2400">
+                <a:solidFill>
+                  <a:srgbClr val="1B1B1B"/>
+                </a:solidFill>
+              </a:rPr>
+              <a:t>để tạo ra các đối tượng </a:t>
+            </a:r>
+            <a:r>
+              <a:rPr lang="en-US" sz="2400">
+                <a:solidFill>
+                  <a:srgbClr val="1B1B1B"/>
+                </a:solidFill>
+              </a:rPr>
+              <a:t>product </a:t>
+            </a:r>
+            <a:r>
+              <a:rPr lang="vi-VN" sz="2400">
+                <a:solidFill>
+                  <a:srgbClr val="1B1B1B"/>
+                </a:solidFill>
+              </a:rPr>
+              <a:t>cụ thể.</a:t>
+            </a:r>
+            <a:endParaRPr lang="en-US" sz="2400">
+              <a:solidFill>
+                <a:srgbClr val="1B1B1B"/>
+              </a:solidFill>
+            </a:endParaRPr>
+          </a:p>
+          <a:p>
+            <a:pPr lvl="0" indent="-381000">
+              <a:lnSpc>
+                <a:spcPct val="115000"/>
+              </a:lnSpc>
+              <a:spcBef>
+                <a:spcPts val="0"/>
+              </a:spcBef>
+              <a:buClr>
+                <a:srgbClr val="1B1B1B"/>
+              </a:buClr>
+              <a:buSzPts val="2400"/>
+              <a:buChar char="-"/>
+            </a:pPr>
+            <a:r>
+              <a:rPr lang="en-US" sz="2400" b="1">
+                <a:solidFill>
+                  <a:srgbClr val="1B1B1B"/>
+                </a:solidFill>
+                <a:highlight>
+                  <a:schemeClr val="lt1"/>
+                </a:highlight>
+              </a:rPr>
+              <a:t>Product:</a:t>
+            </a:r>
+            <a:r>
+              <a:rPr lang="en-US" sz="2400">
+                <a:solidFill>
+                  <a:srgbClr val="1B1B1B"/>
+                </a:solidFill>
+                <a:highlight>
+                  <a:schemeClr val="lt1"/>
+                </a:highlight>
+              </a:rPr>
+              <a:t> Các đối tượng cụ thể được tạo ra bởi các ConcreteFactory tương ứng, chúng cũng cài đặt các phương thức được quy định tại interface AbstractProduct.</a:t>
             </a:r>
             <a:endParaRPr sz="2400">
               <a:solidFill>
@@ -12344,16 +12544,13 @@
             </a:endParaRPr>
           </a:p>
           <a:p>
-            <a:pPr marL="457200" lvl="0" indent="-381000" algn="l" rtl="0">
+            <a:pPr lvl="0" indent="-381000">
               <a:lnSpc>
                 <a:spcPct val="115000"/>
               </a:lnSpc>
               <a:spcBef>
                 <a:spcPts val="0"/>
               </a:spcBef>
-              <a:spcAft>
-                <a:spcPts val="0"/>
-              </a:spcAft>
               <a:buClr>
                 <a:srgbClr val="1B1B1B"/>
               </a:buClr>
@@ -12361,7 +12558,7 @@
               <a:buChar char="-"/>
             </a:pPr>
             <a:r>
-              <a:rPr lang="en-US" sz="2400">
+              <a:rPr lang="en-US" sz="2400" b="1">
                 <a:solidFill>
                   <a:srgbClr val="1B1B1B"/>
                 </a:solidFill>
@@ -12369,34 +12566,8 @@
                   <a:schemeClr val="lt1"/>
                 </a:highlight>
               </a:rPr>
-              <a:t>AbstractProduct: Khai báo dạng interface hoặc abstract class để định nghĩa đối tượng abstract.</a:t>
+              <a:t>Client:</a:t>
             </a:r>
-            <a:endParaRPr sz="2400">
-              <a:solidFill>
-                <a:srgbClr val="1B1B1B"/>
-              </a:solidFill>
-              <a:highlight>
-                <a:schemeClr val="lt1"/>
-              </a:highlight>
-            </a:endParaRPr>
-          </a:p>
-          <a:p>
-            <a:pPr marL="457200" lvl="0" indent="-381000" algn="l" rtl="0">
-              <a:lnSpc>
-                <a:spcPct val="115000"/>
-              </a:lnSpc>
-              <a:spcBef>
-                <a:spcPts val="0"/>
-              </a:spcBef>
-              <a:spcAft>
-                <a:spcPts val="0"/>
-              </a:spcAft>
-              <a:buClr>
-                <a:srgbClr val="1B1B1B"/>
-              </a:buClr>
-              <a:buSzPts val="2400"/>
-              <a:buChar char="-"/>
-            </a:pPr>
             <a:r>
               <a:rPr lang="en-US" sz="2400">
                 <a:solidFill>
@@ -12406,34 +12577,40 @@
                   <a:schemeClr val="lt1"/>
                 </a:highlight>
               </a:rPr>
-              <a:t>Product: Cài đặt của các đối tượng cụ thể, cài đặt các phương thức được quy định tại AbstractProduct.</a:t>
+              <a:t> </a:t>
             </a:r>
-            <a:endParaRPr sz="2400">
-              <a:solidFill>
-                <a:srgbClr val="1B1B1B"/>
-              </a:solidFill>
-              <a:highlight>
-                <a:schemeClr val="lt1"/>
-              </a:highlight>
-            </a:endParaRPr>
-          </a:p>
-          <a:p>
-            <a:pPr marL="457200" lvl="0" indent="-381000" algn="l" rtl="0">
-              <a:lnSpc>
-                <a:spcPct val="115000"/>
-              </a:lnSpc>
-              <a:spcBef>
-                <a:spcPts val="0"/>
-              </a:spcBef>
-              <a:spcAft>
-                <a:spcPts val="0"/>
-              </a:spcAft>
-              <a:buClr>
-                <a:srgbClr val="1B1B1B"/>
-              </a:buClr>
-              <a:buSzPts val="2400"/>
-              <a:buChar char="-"/>
-            </a:pPr>
+            <a:r>
+              <a:rPr lang="en-US" sz="2400">
+                <a:solidFill>
+                  <a:srgbClr val="1B1B1B"/>
+                </a:solidFill>
+              </a:rPr>
+              <a:t>chỉ s</a:t>
+            </a:r>
+            <a:r>
+              <a:rPr lang="vi-VN" sz="2400">
+                <a:solidFill>
+                  <a:srgbClr val="1B1B1B"/>
+                </a:solidFill>
+              </a:rPr>
+              <a:t>ử dụng các interface</a:t>
+            </a:r>
+            <a:r>
+              <a:rPr lang="en-US" sz="2400">
+                <a:solidFill>
+                  <a:srgbClr val="1B1B1B"/>
+                </a:solidFill>
+              </a:rPr>
+              <a:t>s được </a:t>
+            </a:r>
+            <a:r>
+              <a:rPr lang="vi-VN" sz="2400">
+                <a:solidFill>
+                  <a:srgbClr val="1B1B1B"/>
+                </a:solidFill>
+              </a:rPr>
+              <a:t>khai báo bởi AbstractFactory và </a:t>
+            </a:r>
             <a:r>
               <a:rPr lang="en-US" sz="2400">
                 <a:solidFill>
@@ -12443,7 +12620,58 @@
                   <a:schemeClr val="lt1"/>
                 </a:highlight>
               </a:rPr>
-              <a:t>Client: là đối tượng sử dụng AbstractFactory và các AbstractProduct.</a:t>
+              <a:t>AbstractProduct</a:t>
+            </a:r>
+            <a:r>
+              <a:rPr lang="vi-VN" sz="2400">
+                <a:solidFill>
+                  <a:srgbClr val="1B1B1B"/>
+                </a:solidFill>
+              </a:rPr>
+              <a:t> để tạo</a:t>
+            </a:r>
+            <a:r>
+              <a:rPr lang="en-US" sz="2400">
+                <a:solidFill>
+                  <a:srgbClr val="1B1B1B"/>
+                </a:solidFill>
+              </a:rPr>
+              <a:t> </a:t>
+            </a:r>
+            <a:r>
+              <a:rPr lang="vi-VN" sz="2400">
+                <a:solidFill>
+                  <a:srgbClr val="1B1B1B"/>
+                </a:solidFill>
+              </a:rPr>
+              <a:t>và sử dụng các đối tượng </a:t>
+            </a:r>
+            <a:r>
+              <a:rPr lang="en-US" sz="2400">
+                <a:solidFill>
+                  <a:srgbClr val="1B1B1B"/>
+                </a:solidFill>
+              </a:rPr>
+              <a:t>(mà </a:t>
+            </a:r>
+            <a:r>
+              <a:rPr lang="vi-VN" sz="2400">
+                <a:solidFill>
+                  <a:srgbClr val="1B1B1B"/>
+                </a:solidFill>
+              </a:rPr>
+              <a:t>không cần biết chi tiết về cách chúng được tạo ra</a:t>
+            </a:r>
+            <a:r>
+              <a:rPr lang="en-US" sz="2400">
+                <a:solidFill>
+                  <a:srgbClr val="1B1B1B"/>
+                </a:solidFill>
+                <a:highlight>
+                  <a:schemeClr val="lt1"/>
+                </a:highlight>
+              </a:rPr>
+              <a:t>).</a:t>
             </a:r>
             <a:endParaRPr sz="2400"/>
           </a:p>
@@ -12753,67 +12981,6 @@
                                           <p:spTgt spid="88">
                                             <p:txEl>
                                               <p:pRg st="4" end="4"/>
-                                            </p:txEl>
-                                          </p:spTgt>
-                                        </p:tgtEl>
-                                      </p:cBhvr>
-                                    </p:animEffect>
-                                  </p:childTnLst>
-                                </p:cTn>
-                              </p:par>
-                            </p:childTnLst>
-                          </p:cTn>
-                        </p:par>
-                      </p:childTnLst>
-                    </p:cTn>
-                  </p:par>
-                  <p:par>
-                    <p:cTn id="28" fill="hold">
-                      <p:stCondLst>
-                        <p:cond delay="indefinite"/>
-                      </p:stCondLst>
-                      <p:childTnLst>
-                        <p:par>
-                          <p:cTn id="29" fill="hold">
-                            <p:stCondLst>
-                              <p:cond delay="0"/>
-                            </p:stCondLst>
-                            <p:childTnLst>
-                              <p:par>
-                                <p:cTn id="30" presetID="10" presetClass="entr" presetSubtype="0" fill="hold" nodeType="clickEffect">
-                                  <p:stCondLst>
-                                    <p:cond delay="0"/>
-                                  </p:stCondLst>
-                                  <p:childTnLst>
-                                    <p:set>
-                                      <p:cBhvr>
-                                        <p:cTn id="31" dur="1" fill="hold">
-                                          <p:stCondLst>
-                                            <p:cond delay="0"/>
-                                          </p:stCondLst>
-                                        </p:cTn>
-                                        <p:tgtEl>
-                                          <p:spTgt spid="88">
-                                            <p:txEl>
-                                              <p:pRg st="5" end="5"/>
-                                            </p:txEl>
-                                          </p:spTgt>
-                                        </p:tgtEl>
-                                        <p:attrNameLst>
-                                          <p:attrName>style.visibility</p:attrName>
-                                        </p:attrNameLst>
-                                      </p:cBhvr>
-                                      <p:to>
-                                        <p:strVal val="visible"/>
-                                      </p:to>
-                                    </p:set>
-                                    <p:animEffect transition="in" filter="fade">
-                                      <p:cBhvr>
-                                        <p:cTn id="32" dur="1000"/>
-                                        <p:tgtEl>
-                                          <p:spTgt spid="88">
-                                            <p:txEl>
-                                              <p:pRg st="5" end="5"/>
                                             </p:txEl>
                                           </p:spTgt>
                                         </p:tgtEl>

</xml_diff>